<commit_message>
VIS Sattmove Layout angepasst
</commit_message>
<xml_diff>
--- a/agile moves/Vision (VIS)/ger_VIS_05_wie_satt_gehe_ich_ins_bett.pptx
+++ b/agile moves/Vision (VIS)/ger_VIS_05_wie_satt_gehe_ich_ins_bett.pptx
@@ -755,7 +755,7 @@
           <a:p>
             <a:fld id="{FF5B2BAF-DF38-0A48-A798-0C06E514FD52}" type="datetimeFigureOut">
               <a:rPr lang="de-DE" smtClean="0"/>
-              <a:t>18.06.15</a:t>
+              <a:t>06.07.15</a:t>
             </a:fld>
             <a:endParaRPr lang="de-DE" dirty="0"/>
           </a:p>
@@ -978,7 +978,7 @@
           <a:p>
             <a:fld id="{FF5B2BAF-DF38-0A48-A798-0C06E514FD52}" type="datetimeFigureOut">
               <a:rPr lang="de-DE" smtClean="0"/>
-              <a:t>18.06.15</a:t>
+              <a:t>06.07.15</a:t>
             </a:fld>
             <a:endParaRPr lang="de-DE" dirty="0"/>
           </a:p>
@@ -1621,22 +1621,19 @@
             <p:ph type="ctrTitle"/>
           </p:nvPr>
         </p:nvSpPr>
-        <p:spPr/>
+        <p:spPr>
+          <a:xfrm>
+            <a:off x="1166813" y="838750"/>
+            <a:ext cx="4612406" cy="461665"/>
+          </a:xfrm>
+        </p:spPr>
         <p:txBody>
           <a:bodyPr/>
           <a:lstStyle/>
           <a:p>
             <a:r>
               <a:rPr lang="de-DE" dirty="0" smtClean="0"/>
-              <a:t>Wie satt </a:t>
-            </a:r>
-            <a:r>
-              <a:rPr lang="de-DE" dirty="0" smtClean="0"/>
-              <a:t>ich gehe </a:t>
-            </a:r>
-            <a:r>
-              <a:rPr lang="de-DE" dirty="0" smtClean="0"/>
-              <a:t>ins Bett?</a:t>
+              <a:t>Wie satt ich gehe ins Bett?</a:t>
             </a:r>
             <a:endParaRPr lang="de-DE" dirty="0"/>
           </a:p>

</xml_diff>